<commit_message>
fix: fix code by code review
</commit_message>
<xml_diff>
--- a/Retro/Retro2.pptx
+++ b/Retro/Retro2.pptx
@@ -6,8 +6,8 @@
   </p:sldMasterIdLst>
   <p:sldIdLst>
     <p:sldId id="259" r:id="rId2"/>
-    <p:sldId id="260" r:id="rId3"/>
-    <p:sldId id="257" r:id="rId4"/>
+    <p:sldId id="257" r:id="rId3"/>
+    <p:sldId id="260" r:id="rId4"/>
     <p:sldId id="258" r:id="rId5"/>
   </p:sldIdLst>
   <p:sldSz cx="12192000" cy="6858000"/>
@@ -107,6 +107,11 @@
       </a:defRPr>
     </a:lvl9pPr>
   </p:defaultTextStyle>
+  <p:extLst>
+    <p:ext uri="{EFAFB233-063F-42B5-8137-9DF3F51BA10A}">
+      <p15:sldGuideLst xmlns:p15="http://schemas.microsoft.com/office/powerpoint/2012/main"/>
+    </p:ext>
+  </p:extLst>
 </p:presentation>
 </file>
 
@@ -3897,7 +3902,7 @@
         </p:spPr>
         <p:txBody>
           <a:bodyPr>
-            <a:normAutofit lnSpcReduction="10000"/>
+            <a:normAutofit fontScale="92500" lnSpcReduction="10000"/>
           </a:bodyPr>
           <a:lstStyle/>
           <a:p>
@@ -4148,6 +4153,50 @@
             <a:r>
               <a:rPr lang="en-US" sz="2000" dirty="0"/>
               <a:t>JS, React</a:t>
+            </a:r>
+            <a:r>
+              <a:rPr lang="en-US" dirty="0"/>
+              <a:t>, Redux, </a:t>
+            </a:r>
+            <a:r>
+              <a:rPr lang="ru-RU" dirty="0"/>
+              <a:t>Исправление модулей </a:t>
+            </a:r>
+            <a:r>
+              <a:rPr lang="en-US" dirty="0"/>
+              <a:t>Header </a:t>
+            </a:r>
+            <a:r>
+              <a:rPr lang="ru-RU" dirty="0"/>
+              <a:t>и </a:t>
+            </a:r>
+            <a:r>
+              <a:rPr lang="en-US" dirty="0"/>
+              <a:t>App (</a:t>
+            </a:r>
+            <a:r>
+              <a:rPr lang="ru-RU" dirty="0"/>
+              <a:t>использовал хук для </a:t>
+            </a:r>
+            <a:r>
+              <a:rPr lang="ru-RU" dirty="0" err="1"/>
+              <a:t>изменени</a:t>
+            </a:r>
+            <a:r>
+              <a:rPr lang="ru-RU" dirty="0"/>
+              <a:t> состояния из </a:t>
+            </a:r>
+            <a:r>
+              <a:rPr lang="en-US" dirty="0"/>
+              <a:t>Header </a:t>
+            </a:r>
+            <a:r>
+              <a:rPr lang="ru-RU" dirty="0"/>
+              <a:t>для </a:t>
+            </a:r>
+            <a:r>
+              <a:rPr lang="en-US" dirty="0"/>
+              <a:t>App)</a:t>
             </a:r>
             <a:endParaRPr lang="ru-RU" sz="2000" dirty="0"/>
           </a:p>
@@ -4191,6 +4240,116 @@
           <p:cNvPr id="2" name="Заголовок 1">
             <a:extLst>
               <a:ext uri="{FF2B5EF4-FFF2-40B4-BE49-F238E27FC236}">
+                <a16:creationId xmlns:a16="http://schemas.microsoft.com/office/drawing/2014/main" id="{EBB66F6D-164B-5E65-464F-C24632B48D11}"/>
+              </a:ext>
+            </a:extLst>
+          </p:cNvPr>
+          <p:cNvSpPr>
+            <a:spLocks noGrp="1"/>
+          </p:cNvSpPr>
+          <p:nvPr>
+            <p:ph type="title"/>
+          </p:nvPr>
+        </p:nvSpPr>
+        <p:spPr/>
+        <p:txBody>
+          <a:bodyPr/>
+          <a:lstStyle/>
+          <a:p>
+            <a:endParaRPr lang="ru-BY"/>
+          </a:p>
+        </p:txBody>
+      </p:sp>
+      <p:sp>
+        <p:nvSpPr>
+          <p:cNvPr id="3" name="Объект 2">
+            <a:extLst>
+              <a:ext uri="{FF2B5EF4-FFF2-40B4-BE49-F238E27FC236}">
+                <a16:creationId xmlns:a16="http://schemas.microsoft.com/office/drawing/2014/main" id="{287361BA-72C9-D0E9-8559-E989A57327B5}"/>
+              </a:ext>
+            </a:extLst>
+          </p:cNvPr>
+          <p:cNvSpPr>
+            <a:spLocks noGrp="1"/>
+          </p:cNvSpPr>
+          <p:nvPr>
+            <p:ph idx="1"/>
+          </p:nvPr>
+        </p:nvSpPr>
+        <p:spPr/>
+        <p:txBody>
+          <a:bodyPr/>
+          <a:lstStyle/>
+          <a:p>
+            <a:endParaRPr lang="ru-BY"/>
+          </a:p>
+        </p:txBody>
+      </p:sp>
+      <p:pic>
+        <p:nvPicPr>
+          <p:cNvPr id="5" name="Рисунок 4">
+            <a:extLst>
+              <a:ext uri="{FF2B5EF4-FFF2-40B4-BE49-F238E27FC236}">
+                <a16:creationId xmlns:a16="http://schemas.microsoft.com/office/drawing/2014/main" id="{0C72066E-6B50-46AB-6564-7BE0CBA2D61C}"/>
+              </a:ext>
+            </a:extLst>
+          </p:cNvPr>
+          <p:cNvPicPr>
+            <a:picLocks noChangeAspect="1"/>
+          </p:cNvPicPr>
+          <p:nvPr/>
+        </p:nvPicPr>
+        <p:blipFill>
+          <a:blip r:embed="rId2"/>
+          <a:stretch>
+            <a:fillRect/>
+          </a:stretch>
+        </p:blipFill>
+        <p:spPr>
+          <a:xfrm>
+            <a:off x="-286871" y="1"/>
+            <a:ext cx="12864353" cy="6858000"/>
+          </a:xfrm>
+          <a:prstGeom prst="rect">
+            <a:avLst/>
+          </a:prstGeom>
+        </p:spPr>
+      </p:pic>
+    </p:spTree>
+    <p:extLst>
+      <p:ext uri="{BB962C8B-B14F-4D97-AF65-F5344CB8AC3E}">
+        <p14:creationId xmlns:p14="http://schemas.microsoft.com/office/powerpoint/2010/main" val="3354583571"/>
+      </p:ext>
+    </p:extLst>
+  </p:cSld>
+  <p:clrMapOvr>
+    <a:masterClrMapping/>
+  </p:clrMapOvr>
+</p:sld>
+</file>
+
+<file path=ppt/slides/slide3.xml><?xml version="1.0" encoding="utf-8"?>
+<p:sld xmlns:a="http://schemas.openxmlformats.org/drawingml/2006/main" xmlns:r="http://schemas.openxmlformats.org/officeDocument/2006/relationships" xmlns:p="http://schemas.openxmlformats.org/presentationml/2006/main">
+  <p:cSld>
+    <p:spTree>
+      <p:nvGrpSpPr>
+        <p:cNvPr id="1" name=""/>
+        <p:cNvGrpSpPr/>
+        <p:nvPr/>
+      </p:nvGrpSpPr>
+      <p:grpSpPr>
+        <a:xfrm>
+          <a:off x="0" y="0"/>
+          <a:ext cx="0" cy="0"/>
+          <a:chOff x="0" y="0"/>
+          <a:chExt cx="0" cy="0"/>
+        </a:xfrm>
+      </p:grpSpPr>
+      <p:sp>
+        <p:nvSpPr>
+          <p:cNvPr id="2" name="Заголовок 1">
+            <a:extLst>
+              <a:ext uri="{FF2B5EF4-FFF2-40B4-BE49-F238E27FC236}">
                 <a16:creationId xmlns:a16="http://schemas.microsoft.com/office/drawing/2014/main" id="{DC9C6CB6-A0E4-7D91-8E97-CA7D0BD92B95}"/>
               </a:ext>
             </a:extLst>
@@ -4220,31 +4379,6 @@
               <a:rPr lang="ru-RU" dirty="0"/>
               <a:t> проекта</a:t>
             </a:r>
-            <a:endParaRPr lang="ru-BY" dirty="0"/>
-          </a:p>
-        </p:txBody>
-      </p:sp>
-      <p:sp>
-        <p:nvSpPr>
-          <p:cNvPr id="3" name="Объект 2">
-            <a:extLst>
-              <a:ext uri="{FF2B5EF4-FFF2-40B4-BE49-F238E27FC236}">
-                <a16:creationId xmlns:a16="http://schemas.microsoft.com/office/drawing/2014/main" id="{D301E8EA-7C85-8680-FA59-347F333B571E}"/>
-              </a:ext>
-            </a:extLst>
-          </p:cNvPr>
-          <p:cNvSpPr>
-            <a:spLocks noGrp="1"/>
-          </p:cNvSpPr>
-          <p:nvPr>
-            <p:ph idx="1"/>
-          </p:nvPr>
-        </p:nvSpPr>
-        <p:spPr/>
-        <p:txBody>
-          <a:bodyPr/>
-          <a:lstStyle/>
-          <a:p>
             <a:endParaRPr lang="ru-BY" dirty="0"/>
           </a:p>
         </p:txBody>
@@ -4283,116 +4417,6 @@
     <p:extLst>
       <p:ext uri="{BB962C8B-B14F-4D97-AF65-F5344CB8AC3E}">
         <p14:creationId xmlns:p14="http://schemas.microsoft.com/office/powerpoint/2010/main" val="1608268917"/>
-      </p:ext>
-    </p:extLst>
-  </p:cSld>
-  <p:clrMapOvr>
-    <a:masterClrMapping/>
-  </p:clrMapOvr>
-</p:sld>
-</file>
-
-<file path=ppt/slides/slide3.xml><?xml version="1.0" encoding="utf-8"?>
-<p:sld xmlns:a="http://schemas.openxmlformats.org/drawingml/2006/main" xmlns:r="http://schemas.openxmlformats.org/officeDocument/2006/relationships" xmlns:p="http://schemas.openxmlformats.org/presentationml/2006/main">
-  <p:cSld>
-    <p:spTree>
-      <p:nvGrpSpPr>
-        <p:cNvPr id="1" name=""/>
-        <p:cNvGrpSpPr/>
-        <p:nvPr/>
-      </p:nvGrpSpPr>
-      <p:grpSpPr>
-        <a:xfrm>
-          <a:off x="0" y="0"/>
-          <a:ext cx="0" cy="0"/>
-          <a:chOff x="0" y="0"/>
-          <a:chExt cx="0" cy="0"/>
-        </a:xfrm>
-      </p:grpSpPr>
-      <p:sp>
-        <p:nvSpPr>
-          <p:cNvPr id="2" name="Заголовок 1">
-            <a:extLst>
-              <a:ext uri="{FF2B5EF4-FFF2-40B4-BE49-F238E27FC236}">
-                <a16:creationId xmlns:a16="http://schemas.microsoft.com/office/drawing/2014/main" id="{EBB66F6D-164B-5E65-464F-C24632B48D11}"/>
-              </a:ext>
-            </a:extLst>
-          </p:cNvPr>
-          <p:cNvSpPr>
-            <a:spLocks noGrp="1"/>
-          </p:cNvSpPr>
-          <p:nvPr>
-            <p:ph type="title"/>
-          </p:nvPr>
-        </p:nvSpPr>
-        <p:spPr/>
-        <p:txBody>
-          <a:bodyPr/>
-          <a:lstStyle/>
-          <a:p>
-            <a:endParaRPr lang="ru-BY"/>
-          </a:p>
-        </p:txBody>
-      </p:sp>
-      <p:sp>
-        <p:nvSpPr>
-          <p:cNvPr id="3" name="Объект 2">
-            <a:extLst>
-              <a:ext uri="{FF2B5EF4-FFF2-40B4-BE49-F238E27FC236}">
-                <a16:creationId xmlns:a16="http://schemas.microsoft.com/office/drawing/2014/main" id="{287361BA-72C9-D0E9-8559-E989A57327B5}"/>
-              </a:ext>
-            </a:extLst>
-          </p:cNvPr>
-          <p:cNvSpPr>
-            <a:spLocks noGrp="1"/>
-          </p:cNvSpPr>
-          <p:nvPr>
-            <p:ph idx="1"/>
-          </p:nvPr>
-        </p:nvSpPr>
-        <p:spPr/>
-        <p:txBody>
-          <a:bodyPr/>
-          <a:lstStyle/>
-          <a:p>
-            <a:endParaRPr lang="ru-BY"/>
-          </a:p>
-        </p:txBody>
-      </p:sp>
-      <p:pic>
-        <p:nvPicPr>
-          <p:cNvPr id="5" name="Рисунок 4">
-            <a:extLst>
-              <a:ext uri="{FF2B5EF4-FFF2-40B4-BE49-F238E27FC236}">
-                <a16:creationId xmlns:a16="http://schemas.microsoft.com/office/drawing/2014/main" id="{0C72066E-6B50-46AB-6564-7BE0CBA2D61C}"/>
-              </a:ext>
-            </a:extLst>
-          </p:cNvPr>
-          <p:cNvPicPr>
-            <a:picLocks noChangeAspect="1"/>
-          </p:cNvPicPr>
-          <p:nvPr/>
-        </p:nvPicPr>
-        <p:blipFill>
-          <a:blip r:embed="rId2"/>
-          <a:stretch>
-            <a:fillRect/>
-          </a:stretch>
-        </p:blipFill>
-        <p:spPr>
-          <a:xfrm>
-            <a:off x="-286871" y="1"/>
-            <a:ext cx="12864353" cy="6858000"/>
-          </a:xfrm>
-          <a:prstGeom prst="rect">
-            <a:avLst/>
-          </a:prstGeom>
-        </p:spPr>
-      </p:pic>
-    </p:spTree>
-    <p:extLst>
-      <p:ext uri="{BB962C8B-B14F-4D97-AF65-F5344CB8AC3E}">
-        <p14:creationId xmlns:p14="http://schemas.microsoft.com/office/powerpoint/2010/main" val="3354583571"/>
       </p:ext>
     </p:extLst>
   </p:cSld>

</xml_diff>